<commit_message>
Fixing up parameters for new ppt theme
</commit_message>
<xml_diff>
--- a/inst/extdata/template_fullslide.pptx
+++ b/inst/extdata/template_fullslide.pptx
@@ -203,7 +203,7 @@
           <a:p>
             <a:fld id="{E6375376-077A-8F42-9E71-155E70FB596E}" type="datetimeFigureOut">
               <a:rPr lang="en-US" smtClean="0"/>
-              <a:t>5/26/23</a:t>
+              <a:t>1/14/2025</a:t>
             </a:fld>
             <a:endParaRPr lang="en-US"/>
           </a:p>
@@ -1153,7 +1153,7 @@
           <a:p>
             <a:fld id="{184C34C6-D93D-964F-98F1-8B05274CB5BF}" type="datetimeFigureOut">
               <a:rPr lang="en-US" smtClean="0"/>
-              <a:t>5/26/23</a:t>
+              <a:t>1/14/2025</a:t>
             </a:fld>
             <a:endParaRPr lang="en-US"/>
           </a:p>
@@ -1374,7 +1374,7 @@
           <a:p>
             <a:fld id="{184C34C6-D93D-964F-98F1-8B05274CB5BF}" type="datetimeFigureOut">
               <a:rPr lang="en-US" smtClean="0"/>
-              <a:t>5/26/23</a:t>
+              <a:t>1/14/2025</a:t>
             </a:fld>
             <a:endParaRPr lang="en-US" dirty="0"/>
           </a:p>
@@ -1698,7 +1698,7 @@
           <a:p>
             <a:fld id="{184C34C6-D93D-964F-98F1-8B05274CB5BF}" type="datetimeFigureOut">
               <a:rPr lang="en-US" smtClean="0"/>
-              <a:t>5/26/23</a:t>
+              <a:t>1/14/2025</a:t>
             </a:fld>
             <a:endParaRPr lang="en-US" dirty="0"/>
           </a:p>
@@ -2215,7 +2215,7 @@
           <a:p>
             <a:fld id="{184C34C6-D93D-964F-98F1-8B05274CB5BF}" type="datetimeFigureOut">
               <a:rPr lang="en-US" smtClean="0"/>
-              <a:t>5/26/23</a:t>
+              <a:t>1/14/2025</a:t>
             </a:fld>
             <a:endParaRPr lang="en-US" dirty="0"/>
           </a:p>
@@ -2576,7 +2576,7 @@
         </p:spPr>
         <p:txBody>
           <a:bodyPr>
-            <a:noAutofit/>
+            <a:normAutofit/>
           </a:bodyPr>
           <a:lstStyle>
             <a:lvl1pPr marL="0" indent="0">
@@ -2612,16 +2612,22 @@
         </p:nvSpPr>
         <p:spPr>
           <a:xfrm>
-            <a:off x="371475" y="6609900"/>
-            <a:ext cx="10662320" cy="204762"/>
+            <a:off x="371474" y="6586456"/>
+            <a:ext cx="11412539" cy="228206"/>
           </a:xfrm>
         </p:spPr>
         <p:txBody>
           <a:bodyPr>
-            <a:noAutofit/>
+            <a:normAutofit/>
           </a:bodyPr>
           <a:lstStyle>
             <a:lvl1pPr marL="0" indent="0">
+              <a:lnSpc>
+                <a:spcPct val="100000"/>
+              </a:lnSpc>
+              <a:spcBef>
+                <a:spcPts val="0"/>
+              </a:spcBef>
               <a:buNone/>
               <a:defRPr sz="800"/>
             </a:lvl1pPr>
@@ -2900,7 +2906,7 @@
           <a:p>
             <a:fld id="{184C34C6-D93D-964F-98F1-8B05274CB5BF}" type="datetimeFigureOut">
               <a:rPr lang="en-AU" noProof="0" smtClean="0"/>
-              <a:t>26/5/2023</a:t>
+              <a:t>14/01/2025</a:t>
             </a:fld>
             <a:endParaRPr lang="en-AU" noProof="0"/>
           </a:p>

</xml_diff>

<commit_message>
Update caption length to 240
Also bottom align the template_fullslide.pptx
</commit_message>
<xml_diff>
--- a/inst/extdata/template_fullslide.pptx
+++ b/inst/extdata/template_fullslide.pptx
@@ -203,7 +203,7 @@
           <a:p>
             <a:fld id="{E6375376-077A-8F42-9E71-155E70FB596E}" type="datetimeFigureOut">
               <a:rPr lang="en-US" smtClean="0"/>
-              <a:t>1/14/2025</a:t>
+              <a:t>2/14/2025</a:t>
             </a:fld>
             <a:endParaRPr lang="en-US"/>
           </a:p>
@@ -1153,7 +1153,7 @@
           <a:p>
             <a:fld id="{184C34C6-D93D-964F-98F1-8B05274CB5BF}" type="datetimeFigureOut">
               <a:rPr lang="en-US" smtClean="0"/>
-              <a:t>1/14/2025</a:t>
+              <a:t>2/14/2025</a:t>
             </a:fld>
             <a:endParaRPr lang="en-US"/>
           </a:p>
@@ -1374,7 +1374,7 @@
           <a:p>
             <a:fld id="{184C34C6-D93D-964F-98F1-8B05274CB5BF}" type="datetimeFigureOut">
               <a:rPr lang="en-US" smtClean="0"/>
-              <a:t>1/14/2025</a:t>
+              <a:t>2/14/2025</a:t>
             </a:fld>
             <a:endParaRPr lang="en-US" dirty="0"/>
           </a:p>
@@ -1698,7 +1698,7 @@
           <a:p>
             <a:fld id="{184C34C6-D93D-964F-98F1-8B05274CB5BF}" type="datetimeFigureOut">
               <a:rPr lang="en-US" smtClean="0"/>
-              <a:t>1/14/2025</a:t>
+              <a:t>2/14/2025</a:t>
             </a:fld>
             <a:endParaRPr lang="en-US" dirty="0"/>
           </a:p>
@@ -2215,7 +2215,7 @@
           <a:p>
             <a:fld id="{184C34C6-D93D-964F-98F1-8B05274CB5BF}" type="datetimeFigureOut">
               <a:rPr lang="en-US" smtClean="0"/>
-              <a:t>1/14/2025</a:t>
+              <a:t>2/14/2025</a:t>
             </a:fld>
             <a:endParaRPr lang="en-US" dirty="0"/>
           </a:p>
@@ -2617,8 +2617,8 @@
           </a:xfrm>
         </p:spPr>
         <p:txBody>
-          <a:bodyPr>
-            <a:normAutofit/>
+          <a:bodyPr anchor="b" anchorCtr="0">
+            <a:noAutofit/>
           </a:bodyPr>
           <a:lstStyle>
             <a:lvl1pPr marL="0" indent="0">
@@ -2906,7 +2906,7 @@
           <a:p>
             <a:fld id="{184C34C6-D93D-964F-98F1-8B05274CB5BF}" type="datetimeFigureOut">
               <a:rPr lang="en-AU" noProof="0" smtClean="0"/>
-              <a:t>14/01/2025</a:t>
+              <a:t>14/02/2025</a:t>
             </a:fld>
             <a:endParaRPr lang="en-AU" noProof="0"/>
           </a:p>

</xml_diff>

<commit_message>
Updates to .pptx slide templates
</commit_message>
<xml_diff>
--- a/inst/extdata/template_fullslide.pptx
+++ b/inst/extdata/template_fullslide.pptx
@@ -5,11 +5,8 @@
     <p:sldMasterId id="2147483831" r:id="rId1"/>
   </p:sldMasterIdLst>
   <p:notesMasterIdLst>
-    <p:notesMasterId r:id="rId3"/>
+    <p:notesMasterId r:id="rId2"/>
   </p:notesMasterIdLst>
-  <p:sldIdLst>
-    <p:sldId id="256" r:id="rId2"/>
-  </p:sldIdLst>
   <p:sldSz cx="12192000" cy="6858000"/>
   <p:notesSz cx="6858000" cy="9144000"/>
   <p:defaultTextStyle>
@@ -206,7 +203,7 @@
           <a:p>
             <a:fld id="{E6375376-077A-8F42-9E71-155E70FB596E}" type="datetimeFigureOut">
               <a:rPr lang="en-US" smtClean="0"/>
-              <a:t>2/26/25</a:t>
+              <a:t>2/28/25</a:t>
             </a:fld>
             <a:endParaRPr lang="en-US"/>
           </a:p>
@@ -1156,7 +1153,7 @@
           <a:p>
             <a:fld id="{184C34C6-D93D-964F-98F1-8B05274CB5BF}" type="datetimeFigureOut">
               <a:rPr lang="en-US" smtClean="0"/>
-              <a:t>2/26/25</a:t>
+              <a:t>2/28/25</a:t>
             </a:fld>
             <a:endParaRPr lang="en-US"/>
           </a:p>
@@ -1377,7 +1374,7 @@
           <a:p>
             <a:fld id="{184C34C6-D93D-964F-98F1-8B05274CB5BF}" type="datetimeFigureOut">
               <a:rPr lang="en-US" smtClean="0"/>
-              <a:t>2/26/25</a:t>
+              <a:t>2/28/25</a:t>
             </a:fld>
             <a:endParaRPr lang="en-US" dirty="0"/>
           </a:p>
@@ -1701,7 +1698,7 @@
           <a:p>
             <a:fld id="{184C34C6-D93D-964F-98F1-8B05274CB5BF}" type="datetimeFigureOut">
               <a:rPr lang="en-US" smtClean="0"/>
-              <a:t>2/26/25</a:t>
+              <a:t>2/28/25</a:t>
             </a:fld>
             <a:endParaRPr lang="en-US" dirty="0"/>
           </a:p>
@@ -2218,7 +2215,7 @@
           <a:p>
             <a:fld id="{184C34C6-D93D-964F-98F1-8B05274CB5BF}" type="datetimeFigureOut">
               <a:rPr lang="en-US" smtClean="0"/>
-              <a:t>2/26/25</a:t>
+              <a:t>2/28/25</a:t>
             </a:fld>
             <a:endParaRPr lang="en-US" dirty="0"/>
           </a:p>
@@ -2909,7 +2906,7 @@
           <a:p>
             <a:fld id="{184C34C6-D93D-964F-98F1-8B05274CB5BF}" type="datetimeFigureOut">
               <a:rPr lang="en-AU" noProof="0" smtClean="0"/>
-              <a:t>26/2/2025</a:t>
+              <a:t>28/2/2025</a:t>
             </a:fld>
             <a:endParaRPr lang="en-AU" noProof="0"/>
           </a:p>
@@ -3321,186 +3318,6 @@
     </p:ext>
   </p:extLst>
 </p:sldMaster>
-</file>
-
-<file path=ppt/slides/slide1.xml><?xml version="1.0" encoding="utf-8"?>
-<p:sld xmlns:a="http://schemas.openxmlformats.org/drawingml/2006/main" xmlns:r="http://schemas.openxmlformats.org/officeDocument/2006/relationships" xmlns:p="http://schemas.openxmlformats.org/presentationml/2006/main">
-  <p:cSld>
-    <p:spTree>
-      <p:nvGrpSpPr>
-        <p:cNvPr id="1" name=""/>
-        <p:cNvGrpSpPr/>
-        <p:nvPr/>
-      </p:nvGrpSpPr>
-      <p:grpSpPr>
-        <a:xfrm>
-          <a:off x="0" y="0"/>
-          <a:ext cx="0" cy="0"/>
-          <a:chOff x="0" y="0"/>
-          <a:chExt cx="0" cy="0"/>
-        </a:xfrm>
-      </p:grpSpPr>
-      <p:sp>
-        <p:nvSpPr>
-          <p:cNvPr id="2" name="Picture Placeholder 1">
-            <a:extLst>
-              <a:ext uri="{FF2B5EF4-FFF2-40B4-BE49-F238E27FC236}">
-                <a16:creationId xmlns:a16="http://schemas.microsoft.com/office/drawing/2014/main" id="{1F4A2C6E-EB18-EB88-8E73-96E81E660B2B}"/>
-              </a:ext>
-            </a:extLst>
-          </p:cNvPr>
-          <p:cNvSpPr>
-            <a:spLocks noGrp="1"/>
-          </p:cNvSpPr>
-          <p:nvPr>
-            <p:ph type="pic" sz="quarter" idx="11"/>
-          </p:nvPr>
-        </p:nvSpPr>
-        <p:spPr/>
-        <p:txBody>
-          <a:bodyPr/>
-          <a:lstStyle/>
-          <a:p>
-            <a:endParaRPr lang="en-US"/>
-          </a:p>
-        </p:txBody>
-      </p:sp>
-      <p:sp>
-        <p:nvSpPr>
-          <p:cNvPr id="3" name="Picture Placeholder 2">
-            <a:extLst>
-              <a:ext uri="{FF2B5EF4-FFF2-40B4-BE49-F238E27FC236}">
-                <a16:creationId xmlns:a16="http://schemas.microsoft.com/office/drawing/2014/main" id="{AE73B399-2F7E-52A0-5FB2-46DA4ACA0928}"/>
-              </a:ext>
-            </a:extLst>
-          </p:cNvPr>
-          <p:cNvSpPr>
-            <a:spLocks noGrp="1"/>
-          </p:cNvSpPr>
-          <p:nvPr>
-            <p:ph type="pic" sz="quarter" idx="12"/>
-          </p:nvPr>
-        </p:nvSpPr>
-        <p:spPr/>
-        <p:txBody>
-          <a:bodyPr/>
-          <a:lstStyle/>
-          <a:p>
-            <a:endParaRPr lang="en-US"/>
-          </a:p>
-        </p:txBody>
-      </p:sp>
-      <p:sp>
-        <p:nvSpPr>
-          <p:cNvPr id="4" name="Text Placeholder 3">
-            <a:extLst>
-              <a:ext uri="{FF2B5EF4-FFF2-40B4-BE49-F238E27FC236}">
-                <a16:creationId xmlns:a16="http://schemas.microsoft.com/office/drawing/2014/main" id="{1CDA4D2D-71F9-A9C7-F9CF-C0B0C41BF460}"/>
-              </a:ext>
-            </a:extLst>
-          </p:cNvPr>
-          <p:cNvSpPr>
-            <a:spLocks noGrp="1"/>
-          </p:cNvSpPr>
-          <p:nvPr>
-            <p:ph type="body" sz="quarter" idx="13"/>
-          </p:nvPr>
-        </p:nvSpPr>
-        <p:spPr/>
-        <p:txBody>
-          <a:bodyPr/>
-          <a:lstStyle/>
-          <a:p>
-            <a:endParaRPr lang="en-US"/>
-          </a:p>
-        </p:txBody>
-      </p:sp>
-      <p:sp>
-        <p:nvSpPr>
-          <p:cNvPr id="5" name="Text Placeholder 4">
-            <a:extLst>
-              <a:ext uri="{FF2B5EF4-FFF2-40B4-BE49-F238E27FC236}">
-                <a16:creationId xmlns:a16="http://schemas.microsoft.com/office/drawing/2014/main" id="{301A95E8-7B29-3A83-18D4-0F1F7497D127}"/>
-              </a:ext>
-            </a:extLst>
-          </p:cNvPr>
-          <p:cNvSpPr>
-            <a:spLocks noGrp="1"/>
-          </p:cNvSpPr>
-          <p:nvPr>
-            <p:ph type="body" sz="quarter" idx="14"/>
-          </p:nvPr>
-        </p:nvSpPr>
-        <p:spPr/>
-        <p:txBody>
-          <a:bodyPr/>
-          <a:lstStyle/>
-          <a:p>
-            <a:endParaRPr lang="en-US"/>
-          </a:p>
-        </p:txBody>
-      </p:sp>
-      <p:sp>
-        <p:nvSpPr>
-          <p:cNvPr id="6" name="Text Placeholder 5">
-            <a:extLst>
-              <a:ext uri="{FF2B5EF4-FFF2-40B4-BE49-F238E27FC236}">
-                <a16:creationId xmlns:a16="http://schemas.microsoft.com/office/drawing/2014/main" id="{40329BCF-3B61-3DDF-5B6C-647EAEF4B5AF}"/>
-              </a:ext>
-            </a:extLst>
-          </p:cNvPr>
-          <p:cNvSpPr>
-            <a:spLocks noGrp="1"/>
-          </p:cNvSpPr>
-          <p:nvPr>
-            <p:ph type="body" sz="quarter" idx="15"/>
-          </p:nvPr>
-        </p:nvSpPr>
-        <p:spPr/>
-        <p:txBody>
-          <a:bodyPr/>
-          <a:lstStyle/>
-          <a:p>
-            <a:endParaRPr lang="en-US"/>
-          </a:p>
-        </p:txBody>
-      </p:sp>
-      <p:sp>
-        <p:nvSpPr>
-          <p:cNvPr id="7" name="Text Placeholder 6">
-            <a:extLst>
-              <a:ext uri="{FF2B5EF4-FFF2-40B4-BE49-F238E27FC236}">
-                <a16:creationId xmlns:a16="http://schemas.microsoft.com/office/drawing/2014/main" id="{E2B22197-2628-EF68-E9DA-F3C9C4EF4A31}"/>
-              </a:ext>
-            </a:extLst>
-          </p:cNvPr>
-          <p:cNvSpPr>
-            <a:spLocks noGrp="1"/>
-          </p:cNvSpPr>
-          <p:nvPr>
-            <p:ph type="body" sz="quarter" idx="16"/>
-          </p:nvPr>
-        </p:nvSpPr>
-        <p:spPr/>
-        <p:txBody>
-          <a:bodyPr/>
-          <a:lstStyle/>
-          <a:p>
-            <a:endParaRPr lang="en-US"/>
-          </a:p>
-        </p:txBody>
-      </p:sp>
-    </p:spTree>
-    <p:extLst>
-      <p:ext uri="{BB962C8B-B14F-4D97-AF65-F5344CB8AC3E}">
-        <p14:creationId xmlns:p14="http://schemas.microsoft.com/office/powerpoint/2010/main" val="117445005"/>
-      </p:ext>
-    </p:extLst>
-  </p:cSld>
-  <p:clrMapOvr>
-    <a:masterClrMapping/>
-  </p:clrMapOvr>
-</p:sld>
 </file>
 
 <file path=ppt/theme/theme1.xml><?xml version="1.0" encoding="utf-8"?>

</xml_diff>